<commit_message>
1.0.0 - Editor Mode
</commit_message>
<xml_diff>
--- a/rmdfigs/DataSummary/DataSummary.pptx
+++ b/rmdfigs/DataSummary/DataSummary.pptx
@@ -5,8 +5,7 @@
     <p:sldMasterId id="2147483648" r:id="rId1"/>
   </p:sldMasterIdLst>
   <p:sldIdLst>
-    <p:sldId id="256" r:id="rId2"/>
-    <p:sldId id="257" r:id="rId3"/>
+    <p:sldId id="257" r:id="rId2"/>
   </p:sldIdLst>
   <p:sldSz cx="12192000" cy="6858000"/>
   <p:notesSz cx="6858000" cy="9144000"/>
@@ -105,6 +104,11 @@
       </a:defRPr>
     </a:lvl9pPr>
   </p:defaultTextStyle>
+  <p:extLst>
+    <p:ext uri="{EFAFB233-063F-42B5-8137-9DF3F51BA10A}">
+      <p15:sldGuideLst xmlns:p15="http://schemas.microsoft.com/office/powerpoint/2012/main"/>
+    </p:ext>
+  </p:extLst>
 </p:presentation>
 </file>
 
@@ -239,7 +243,7 @@
           <a:p>
             <a:fld id="{04644CB6-69E1-E345-BF82-61BFDC8939F8}" type="datetimeFigureOut">
               <a:rPr lang="en-US" smtClean="0"/>
-              <a:t>1/20/18</a:t>
+              <a:t>2/8/18</a:t>
             </a:fld>
             <a:endParaRPr lang="en-US"/>
           </a:p>
@@ -409,7 +413,7 @@
           <a:p>
             <a:fld id="{04644CB6-69E1-E345-BF82-61BFDC8939F8}" type="datetimeFigureOut">
               <a:rPr lang="en-US" smtClean="0"/>
-              <a:t>1/20/18</a:t>
+              <a:t>2/8/18</a:t>
             </a:fld>
             <a:endParaRPr lang="en-US"/>
           </a:p>
@@ -589,7 +593,7 @@
           <a:p>
             <a:fld id="{04644CB6-69E1-E345-BF82-61BFDC8939F8}" type="datetimeFigureOut">
               <a:rPr lang="en-US" smtClean="0"/>
-              <a:t>1/20/18</a:t>
+              <a:t>2/8/18</a:t>
             </a:fld>
             <a:endParaRPr lang="en-US"/>
           </a:p>
@@ -759,7 +763,7 @@
           <a:p>
             <a:fld id="{04644CB6-69E1-E345-BF82-61BFDC8939F8}" type="datetimeFigureOut">
               <a:rPr lang="en-US" smtClean="0"/>
-              <a:t>1/20/18</a:t>
+              <a:t>2/8/18</a:t>
             </a:fld>
             <a:endParaRPr lang="en-US"/>
           </a:p>
@@ -1005,7 +1009,7 @@
           <a:p>
             <a:fld id="{04644CB6-69E1-E345-BF82-61BFDC8939F8}" type="datetimeFigureOut">
               <a:rPr lang="en-US" smtClean="0"/>
-              <a:t>1/20/18</a:t>
+              <a:t>2/8/18</a:t>
             </a:fld>
             <a:endParaRPr lang="en-US"/>
           </a:p>
@@ -1237,7 +1241,7 @@
           <a:p>
             <a:fld id="{04644CB6-69E1-E345-BF82-61BFDC8939F8}" type="datetimeFigureOut">
               <a:rPr lang="en-US" smtClean="0"/>
-              <a:t>1/20/18</a:t>
+              <a:t>2/8/18</a:t>
             </a:fld>
             <a:endParaRPr lang="en-US"/>
           </a:p>
@@ -1604,7 +1608,7 @@
           <a:p>
             <a:fld id="{04644CB6-69E1-E345-BF82-61BFDC8939F8}" type="datetimeFigureOut">
               <a:rPr lang="en-US" smtClean="0"/>
-              <a:t>1/20/18</a:t>
+              <a:t>2/8/18</a:t>
             </a:fld>
             <a:endParaRPr lang="en-US"/>
           </a:p>
@@ -1722,7 +1726,7 @@
           <a:p>
             <a:fld id="{04644CB6-69E1-E345-BF82-61BFDC8939F8}" type="datetimeFigureOut">
               <a:rPr lang="en-US" smtClean="0"/>
-              <a:t>1/20/18</a:t>
+              <a:t>2/8/18</a:t>
             </a:fld>
             <a:endParaRPr lang="en-US"/>
           </a:p>
@@ -1817,7 +1821,7 @@
           <a:p>
             <a:fld id="{04644CB6-69E1-E345-BF82-61BFDC8939F8}" type="datetimeFigureOut">
               <a:rPr lang="en-US" smtClean="0"/>
-              <a:t>1/20/18</a:t>
+              <a:t>2/8/18</a:t>
             </a:fld>
             <a:endParaRPr lang="en-US"/>
           </a:p>
@@ -2094,7 +2098,7 @@
           <a:p>
             <a:fld id="{04644CB6-69E1-E345-BF82-61BFDC8939F8}" type="datetimeFigureOut">
               <a:rPr lang="en-US" smtClean="0"/>
-              <a:t>1/20/18</a:t>
+              <a:t>2/8/18</a:t>
             </a:fld>
             <a:endParaRPr lang="en-US"/>
           </a:p>
@@ -2347,7 +2351,7 @@
           <a:p>
             <a:fld id="{04644CB6-69E1-E345-BF82-61BFDC8939F8}" type="datetimeFigureOut">
               <a:rPr lang="en-US" smtClean="0"/>
-              <a:t>1/20/18</a:t>
+              <a:t>2/8/18</a:t>
             </a:fld>
             <a:endParaRPr lang="en-US"/>
           </a:p>
@@ -2560,7 +2564,7 @@
           <a:p>
             <a:fld id="{04644CB6-69E1-E345-BF82-61BFDC8939F8}" type="datetimeFigureOut">
               <a:rPr lang="en-US" smtClean="0"/>
-              <a:t>1/20/18</a:t>
+              <a:t>2/8/18</a:t>
             </a:fld>
             <a:endParaRPr lang="en-US"/>
           </a:p>
@@ -2965,84 +2969,9 @@
           <a:chExt cx="0" cy="0"/>
         </a:xfrm>
       </p:grpSpPr>
-      <p:sp>
-        <p:nvSpPr>
-          <p:cNvPr id="2" name="Title 1"/>
-          <p:cNvSpPr>
-            <a:spLocks noGrp="1"/>
-          </p:cNvSpPr>
-          <p:nvPr>
-            <p:ph type="ctrTitle"/>
-          </p:nvPr>
-        </p:nvSpPr>
-        <p:spPr/>
-        <p:txBody>
-          <a:bodyPr/>
-          <a:lstStyle/>
-          <a:p>
-            <a:endParaRPr lang="en-US"/>
-          </a:p>
-        </p:txBody>
-      </p:sp>
-      <p:sp>
-        <p:nvSpPr>
-          <p:cNvPr id="3" name="Subtitle 2"/>
-          <p:cNvSpPr>
-            <a:spLocks noGrp="1"/>
-          </p:cNvSpPr>
-          <p:nvPr>
-            <p:ph type="subTitle" idx="1"/>
-          </p:nvPr>
-        </p:nvSpPr>
-        <p:spPr/>
-        <p:txBody>
-          <a:bodyPr/>
-          <a:lstStyle/>
-          <a:p>
-            <a:endParaRPr lang="en-US"/>
-          </a:p>
-        </p:txBody>
-      </p:sp>
-    </p:spTree>
-    <p:extLst>
-      <p:ext uri="{BB962C8B-B14F-4D97-AF65-F5344CB8AC3E}">
-        <p14:creationId xmlns:p14="http://schemas.microsoft.com/office/powerpoint/2010/main" val="1387100428"/>
-      </p:ext>
-    </p:extLst>
-  </p:cSld>
-  <p:clrMapOvr>
-    <a:masterClrMapping/>
-  </p:clrMapOvr>
-  <p:timing>
-    <p:tnLst>
-      <p:par>
-        <p:cTn id="1" dur="indefinite" restart="never" nodeType="tmRoot"/>
-      </p:par>
-    </p:tnLst>
-  </p:timing>
-</p:sld>
-</file>
-
-<file path=ppt/slides/slide2.xml><?xml version="1.0" encoding="utf-8"?>
-<p:sld xmlns:a="http://schemas.openxmlformats.org/drawingml/2006/main" xmlns:r="http://schemas.openxmlformats.org/officeDocument/2006/relationships" xmlns:p="http://schemas.openxmlformats.org/presentationml/2006/main">
-  <p:cSld>
-    <p:spTree>
-      <p:nvGrpSpPr>
-        <p:cNvPr id="1" name=""/>
-        <p:cNvGrpSpPr/>
-        <p:nvPr/>
-      </p:nvGrpSpPr>
-      <p:grpSpPr>
-        <a:xfrm>
-          <a:off x="0" y="0"/>
-          <a:ext cx="0" cy="0"/>
-          <a:chOff x="0" y="0"/>
-          <a:chExt cx="0" cy="0"/>
-        </a:xfrm>
-      </p:grpSpPr>
       <p:pic>
         <p:nvPicPr>
-          <p:cNvPr id="2" name="Picture 1"/>
+          <p:cNvPr id="3" name="Picture 2"/>
           <p:cNvPicPr>
             <a:picLocks noChangeAspect="1"/>
           </p:cNvPicPr>
@@ -3062,8 +2991,8 @@
         </p:blipFill>
         <p:spPr>
           <a:xfrm>
-            <a:off x="0" y="294545"/>
-            <a:ext cx="12192000" cy="5096127"/>
+            <a:off x="0" y="0"/>
+            <a:ext cx="12192000" cy="4653130"/>
           </a:xfrm>
           <a:prstGeom prst="rect">
             <a:avLst/>
@@ -3072,13 +3001,13 @@
       </p:pic>
       <p:pic>
         <p:nvPicPr>
-          <p:cNvPr id="4" name="Picture 3"/>
+          <p:cNvPr id="6" name="Picture 5"/>
           <p:cNvPicPr>
             <a:picLocks noChangeAspect="1"/>
           </p:cNvPicPr>
           <p:nvPr/>
         </p:nvPicPr>
-        <p:blipFill>
+        <p:blipFill rotWithShape="1">
           <a:blip r:embed="rId3">
             <a:extLst>
               <a:ext uri="{28A0092B-C50C-407E-A947-70E740481C1C}">
@@ -3086,14 +3015,13 @@
               </a:ext>
             </a:extLst>
           </a:blip>
-          <a:stretch>
-            <a:fillRect/>
-          </a:stretch>
+          <a:srcRect r="12763"/>
+          <a:stretch/>
         </p:blipFill>
         <p:spPr>
           <a:xfrm>
-            <a:off x="7458872" y="3584955"/>
-            <a:ext cx="4733128" cy="2731928"/>
+            <a:off x="0" y="4522485"/>
+            <a:ext cx="4588959" cy="2335515"/>
           </a:xfrm>
           <a:prstGeom prst="rect">
             <a:avLst/>
@@ -3102,13 +3030,13 @@
       </p:pic>
       <p:pic>
         <p:nvPicPr>
-          <p:cNvPr id="5" name="Picture 4"/>
+          <p:cNvPr id="7" name="Picture 6"/>
           <p:cNvPicPr>
             <a:picLocks noChangeAspect="1"/>
           </p:cNvPicPr>
           <p:nvPr/>
         </p:nvPicPr>
-        <p:blipFill>
+        <p:blipFill rotWithShape="1">
           <a:blip r:embed="rId4">
             <a:extLst>
               <a:ext uri="{28A0092B-C50C-407E-A947-70E740481C1C}">
@@ -3116,14 +3044,71 @@
               </a:ext>
             </a:extLst>
           </a:blip>
-          <a:stretch>
-            <a:fillRect/>
-          </a:stretch>
+          <a:srcRect l="26430" r="12786"/>
+          <a:stretch/>
         </p:blipFill>
         <p:spPr>
           <a:xfrm>
-            <a:off x="7435835" y="1728788"/>
-            <a:ext cx="4756165" cy="1856167"/>
+            <a:off x="4790705" y="4522484"/>
+            <a:ext cx="3181653" cy="2335515"/>
+          </a:xfrm>
+          <a:prstGeom prst="rect">
+            <a:avLst/>
+          </a:prstGeom>
+        </p:spPr>
+      </p:pic>
+      <p:pic>
+        <p:nvPicPr>
+          <p:cNvPr id="8" name="Picture 7"/>
+          <p:cNvPicPr>
+            <a:picLocks noChangeAspect="1"/>
+          </p:cNvPicPr>
+          <p:nvPr/>
+        </p:nvPicPr>
+        <p:blipFill rotWithShape="1">
+          <a:blip r:embed="rId5">
+            <a:extLst>
+              <a:ext uri="{28A0092B-C50C-407E-A947-70E740481C1C}">
+                <a14:useLocalDpi xmlns:a14="http://schemas.microsoft.com/office/drawing/2010/main" val="0"/>
+              </a:ext>
+            </a:extLst>
+          </a:blip>
+          <a:srcRect r="10874"/>
+          <a:stretch/>
+        </p:blipFill>
+        <p:spPr>
+          <a:xfrm>
+            <a:off x="8174105" y="1393939"/>
+            <a:ext cx="4017895" cy="2629422"/>
+          </a:xfrm>
+          <a:prstGeom prst="rect">
+            <a:avLst/>
+          </a:prstGeom>
+        </p:spPr>
+      </p:pic>
+      <p:pic>
+        <p:nvPicPr>
+          <p:cNvPr id="9" name="Picture 8"/>
+          <p:cNvPicPr>
+            <a:picLocks noChangeAspect="1"/>
+          </p:cNvPicPr>
+          <p:nvPr/>
+        </p:nvPicPr>
+        <p:blipFill rotWithShape="1">
+          <a:blip r:embed="rId6">
+            <a:extLst>
+              <a:ext uri="{28A0092B-C50C-407E-A947-70E740481C1C}">
+                <a14:useLocalDpi xmlns:a14="http://schemas.microsoft.com/office/drawing/2010/main" val="0"/>
+              </a:ext>
+            </a:extLst>
+          </a:blip>
+          <a:srcRect r="19429"/>
+          <a:stretch/>
+        </p:blipFill>
+        <p:spPr>
+          <a:xfrm>
+            <a:off x="8174104" y="4044321"/>
+            <a:ext cx="4017896" cy="2813678"/>
           </a:xfrm>
           <a:prstGeom prst="rect">
             <a:avLst/>

</xml_diff>